<commit_message>
cp5w, slides5w, typo CP_chinese_remainder
</commit_message>
<xml_diff>
--- a/spring11/slides11/slides5w.pptx
+++ b/spring11/slides11/slides5w.pptx
@@ -6408,7 +6408,11 @@
             </a:r>
             <a:r>
               <a:rPr lang="en-US" dirty="0" smtClean="0"/>
-              <a:t> 8W.</a:t>
+              <a:t> 5W</a:t>
+            </a:r>
+            <a:r>
+              <a:rPr lang="en-US" dirty="0" smtClean="0"/>
+              <a:t>.</a:t>
             </a:r>
             <a:fld id="{5653AFC6-B420-2E4E-AAAC-D734658728B4}" type="slidenum">
               <a:rPr lang="en-US" smtClean="0"/>
@@ -6512,7 +6516,11 @@
             </a:r>
             <a:r>
               <a:rPr lang="en-US" dirty="0" smtClean="0"/>
-              <a:t> 8W.</a:t>
+              <a:t> 5W</a:t>
+            </a:r>
+            <a:r>
+              <a:rPr lang="en-US" dirty="0" smtClean="0"/>
+              <a:t>.</a:t>
             </a:r>
             <a:fld id="{5653AFC6-B420-2E4E-AAAC-D734658728B4}" type="slidenum">
               <a:rPr lang="en-US" smtClean="0"/>
@@ -6585,7 +6593,11 @@
             </a:r>
             <a:r>
               <a:rPr lang="en-US" dirty="0" smtClean="0"/>
-              <a:t> 8W.</a:t>
+              <a:t> 5W</a:t>
+            </a:r>
+            <a:r>
+              <a:rPr lang="en-US" dirty="0" smtClean="0"/>
+              <a:t>.</a:t>
             </a:r>
             <a:fld id="{5653AFC6-B420-2E4E-AAAC-D734658728B4}" type="slidenum">
               <a:rPr lang="en-US" smtClean="0"/>
@@ -6818,7 +6830,22 @@
                 <a:uFillTx/>
                 <a:latin typeface="Comic Sans MS" pitchFamily="66" charset="0"/>
               </a:rPr>
-              <a:t>Albert R Meyer,        March 31, 2010</a:t>
+              <a:t>Albert R Meyer,        March</a:t>
+            </a:r>
+            <a:r>
+              <a:rPr kumimoji="0" lang="en-US" sz="1200" b="0" i="0" u="none" strike="noStrike" kern="1200" cap="none" spc="0" normalizeH="0" baseline="0" noProof="0" dirty="0" smtClean="0">
+                <a:ln>
+                  <a:noFill/>
+                </a:ln>
+                <a:solidFill>
+                  <a:schemeClr val="tx1"/>
+                </a:solidFill>
+                <a:effectLst/>
+                <a:uLnTx/>
+                <a:uFillTx/>
+                <a:latin typeface="Comic Sans MS" pitchFamily="66" charset="0"/>
+              </a:rPr>
+              <a:t> 2, 2011</a:t>
             </a:r>
             <a:endParaRPr kumimoji="0" lang="en-US" sz="1200" b="0" i="0" u="none" strike="noStrike" kern="1200" cap="none" spc="0" normalizeH="0" baseline="0" noProof="0" dirty="0">
               <a:ln>
@@ -6896,7 +6923,11 @@
             </a:r>
             <a:r>
               <a:rPr lang="en-US" dirty="0" smtClean="0"/>
-              <a:t> 8W.</a:t>
+              <a:t> 5W</a:t>
+            </a:r>
+            <a:r>
+              <a:rPr lang="en-US" dirty="0" smtClean="0"/>
+              <a:t>.</a:t>
             </a:r>
             <a:fld id="{5653AFC6-B420-2E4E-AAAC-D734658728B4}" type="slidenum">
               <a:rPr lang="en-US" smtClean="0"/>
@@ -7465,7 +7496,7 @@
         </p:nvSpPr>
         <p:spPr>
           <a:xfrm>
-            <a:off x="6934200" y="6569075"/>
+            <a:off x="7010400" y="6477000"/>
             <a:ext cx="2133600" cy="365125"/>
           </a:xfrm>
         </p:spPr>
@@ -7474,8 +7505,12 @@
           <a:lstStyle/>
           <a:p>
             <a:r>
+              <a:rPr lang="en-US" dirty="0" err="1" smtClean="0"/>
+              <a:t>lec</a:t>
+            </a:r>
+            <a:r>
               <a:rPr lang="en-US" dirty="0" smtClean="0"/>
-              <a:t>8W.</a:t>
+              <a:t> 5W.</a:t>
             </a:r>
             <a:fld id="{5653AFC6-B420-2E4E-AAAC-D734658728B4}" type="slidenum">
               <a:rPr lang="en-US" smtClean="0"/>
@@ -7862,8 +7897,12 @@
           <a:lstStyle/>
           <a:p>
             <a:r>
+              <a:rPr lang="en-US" dirty="0" err="1" smtClean="0"/>
+              <a:t>lec</a:t>
+            </a:r>
+            <a:r>
               <a:rPr lang="en-US" dirty="0" smtClean="0"/>
-              <a:t>8W.</a:t>
+              <a:t> 5W.</a:t>
             </a:r>
             <a:fld id="{5653AFC6-B420-2E4E-AAAC-D734658728B4}" type="slidenum">
               <a:rPr lang="en-US" smtClean="0"/>
@@ -8431,8 +8470,12 @@
           <a:lstStyle/>
           <a:p>
             <a:r>
+              <a:rPr lang="en-US" dirty="0" err="1" smtClean="0"/>
+              <a:t>lec</a:t>
+            </a:r>
+            <a:r>
               <a:rPr lang="en-US" dirty="0" smtClean="0"/>
-              <a:t>8W.</a:t>
+              <a:t> 5W.</a:t>
             </a:r>
             <a:fld id="{5653AFC6-B420-2E4E-AAAC-D734658728B4}" type="slidenum">
               <a:rPr lang="en-US" smtClean="0"/>
@@ -9222,8 +9265,12 @@
           <a:lstStyle/>
           <a:p>
             <a:r>
+              <a:rPr lang="en-US" dirty="0" err="1" smtClean="0"/>
+              <a:t>lec</a:t>
+            </a:r>
+            <a:r>
               <a:rPr lang="en-US" dirty="0" smtClean="0"/>
-              <a:t>8W.</a:t>
+              <a:t> 5W.</a:t>
             </a:r>
             <a:fld id="{5653AFC6-B420-2E4E-AAAC-D734658728B4}" type="slidenum">
               <a:rPr lang="en-US" smtClean="0"/>
@@ -10186,8 +10233,12 @@
           <a:lstStyle/>
           <a:p>
             <a:r>
+              <a:rPr lang="en-US" dirty="0" err="1" smtClean="0"/>
+              <a:t>lec</a:t>
+            </a:r>
+            <a:r>
               <a:rPr lang="en-US" dirty="0" smtClean="0"/>
-              <a:t>8W.</a:t>
+              <a:t> 5W.</a:t>
             </a:r>
             <a:fld id="{5653AFC6-B420-2E4E-AAAC-D734658728B4}" type="slidenum">
               <a:rPr lang="en-US" smtClean="0"/>
@@ -10764,8 +10815,12 @@
           <a:lstStyle/>
           <a:p>
             <a:r>
+              <a:rPr lang="en-US" dirty="0" err="1" smtClean="0"/>
+              <a:t>lec</a:t>
+            </a:r>
+            <a:r>
               <a:rPr lang="en-US" dirty="0" smtClean="0"/>
-              <a:t>8W.</a:t>
+              <a:t> 5W.</a:t>
             </a:r>
             <a:fld id="{5653AFC6-B420-2E4E-AAAC-D734658728B4}" type="slidenum">
               <a:rPr lang="en-US" smtClean="0"/>
@@ -11398,8 +11453,12 @@
           <a:lstStyle/>
           <a:p>
             <a:r>
+              <a:rPr lang="en-US" dirty="0" err="1" smtClean="0"/>
+              <a:t>lec</a:t>
+            </a:r>
+            <a:r>
               <a:rPr lang="en-US" dirty="0" smtClean="0"/>
-              <a:t>8W.</a:t>
+              <a:t> 5W.</a:t>
             </a:r>
             <a:fld id="{5653AFC6-B420-2E4E-AAAC-D734658728B4}" type="slidenum">
               <a:rPr lang="en-US" smtClean="0"/>
@@ -11880,8 +11939,12 @@
           <a:lstStyle/>
           <a:p>
             <a:r>
+              <a:rPr lang="en-US" dirty="0" err="1" smtClean="0"/>
+              <a:t>lec</a:t>
+            </a:r>
+            <a:r>
               <a:rPr lang="en-US" dirty="0" smtClean="0"/>
-              <a:t>8W.</a:t>
+              <a:t> 5W.</a:t>
             </a:r>
             <a:fld id="{5653AFC6-B420-2E4E-AAAC-D734658728B4}" type="slidenum">
               <a:rPr lang="en-US" smtClean="0"/>
@@ -12578,8 +12641,12 @@
           <a:lstStyle/>
           <a:p>
             <a:r>
+              <a:rPr lang="en-US" dirty="0" err="1" smtClean="0"/>
+              <a:t>lec</a:t>
+            </a:r>
+            <a:r>
               <a:rPr lang="en-US" dirty="0" smtClean="0"/>
-              <a:t>8W.</a:t>
+              <a:t> 5W.</a:t>
             </a:r>
             <a:fld id="{5653AFC6-B420-2E4E-AAAC-D734658728B4}" type="slidenum">
               <a:rPr lang="en-US" smtClean="0"/>
@@ -13211,8 +13278,12 @@
           <a:lstStyle/>
           <a:p>
             <a:r>
+              <a:rPr lang="en-US" dirty="0" err="1" smtClean="0"/>
+              <a:t>lec</a:t>
+            </a:r>
+            <a:r>
               <a:rPr lang="en-US" dirty="0" smtClean="0"/>
-              <a:t>8W.</a:t>
+              <a:t> 5W.</a:t>
             </a:r>
             <a:fld id="{5653AFC6-B420-2E4E-AAAC-D734658728B4}" type="slidenum">
               <a:rPr lang="en-US" smtClean="0"/>
@@ -13868,8 +13939,12 @@
           <a:lstStyle/>
           <a:p>
             <a:r>
+              <a:rPr lang="en-US" dirty="0" err="1" smtClean="0"/>
+              <a:t>lec</a:t>
+            </a:r>
+            <a:r>
               <a:rPr lang="en-US" dirty="0" smtClean="0"/>
-              <a:t>8W.</a:t>
+              <a:t> 5W.</a:t>
             </a:r>
             <a:fld id="{5653AFC6-B420-2E4E-AAAC-D734658728B4}" type="slidenum">
               <a:rPr lang="en-US" smtClean="0"/>
@@ -14624,8 +14699,12 @@
           <a:lstStyle/>
           <a:p>
             <a:r>
+              <a:rPr lang="en-US" dirty="0" err="1" smtClean="0"/>
+              <a:t>lec</a:t>
+            </a:r>
+            <a:r>
               <a:rPr lang="en-US" dirty="0" smtClean="0"/>
-              <a:t>8W.</a:t>
+              <a:t> 5W.</a:t>
             </a:r>
             <a:fld id="{5653AFC6-B420-2E4E-AAAC-D734658728B4}" type="slidenum">
               <a:rPr lang="en-US" smtClean="0"/>
@@ -15721,7 +15800,7 @@
         </p:nvSpPr>
         <p:spPr>
           <a:xfrm>
-            <a:off x="6553200" y="6356350"/>
+            <a:off x="7010400" y="6477000"/>
             <a:ext cx="2133600" cy="365125"/>
           </a:xfrm>
         </p:spPr>
@@ -15730,8 +15809,12 @@
           <a:lstStyle/>
           <a:p>
             <a:r>
+              <a:rPr lang="en-US" dirty="0" err="1" smtClean="0"/>
+              <a:t>lec</a:t>
+            </a:r>
+            <a:r>
               <a:rPr lang="en-US" dirty="0" smtClean="0"/>
-              <a:t>8W.</a:t>
+              <a:t> 5W.</a:t>
             </a:r>
             <a:fld id="{5653AFC6-B420-2E4E-AAAC-D734658728B4}" type="slidenum">
               <a:rPr lang="en-US" smtClean="0"/>
@@ -16539,8 +16622,12 @@
           <a:lstStyle/>
           <a:p>
             <a:r>
+              <a:rPr lang="en-US" dirty="0" err="1" smtClean="0"/>
+              <a:t>lec</a:t>
+            </a:r>
+            <a:r>
               <a:rPr lang="en-US" dirty="0" smtClean="0"/>
-              <a:t>8W.</a:t>
+              <a:t> 5W.</a:t>
             </a:r>
             <a:fld id="{5653AFC6-B420-2E4E-AAAC-D734658728B4}" type="slidenum">
               <a:rPr lang="en-US" smtClean="0"/>
@@ -17110,8 +17197,12 @@
           <a:lstStyle/>
           <a:p>
             <a:r>
+              <a:rPr lang="en-US" dirty="0" err="1" smtClean="0"/>
+              <a:t>lec</a:t>
+            </a:r>
+            <a:r>
               <a:rPr lang="en-US" dirty="0" smtClean="0"/>
-              <a:t>8W.</a:t>
+              <a:t> 5W.</a:t>
             </a:r>
             <a:fld id="{5653AFC6-B420-2E4E-AAAC-D734658728B4}" type="slidenum">
               <a:rPr lang="en-US" smtClean="0"/>
@@ -17513,8 +17604,12 @@
           <a:lstStyle/>
           <a:p>
             <a:r>
+              <a:rPr lang="en-US" dirty="0" err="1" smtClean="0"/>
+              <a:t>lec</a:t>
+            </a:r>
+            <a:r>
               <a:rPr lang="en-US" dirty="0" smtClean="0"/>
-              <a:t>8W.</a:t>
+              <a:t> 5W.</a:t>
             </a:r>
             <a:fld id="{5653AFC6-B420-2E4E-AAAC-D734658728B4}" type="slidenum">
               <a:rPr lang="en-US" smtClean="0"/>
@@ -18245,8 +18340,12 @@
           <a:lstStyle/>
           <a:p>
             <a:r>
+              <a:rPr lang="en-US" dirty="0" err="1" smtClean="0"/>
+              <a:t>lec</a:t>
+            </a:r>
+            <a:r>
               <a:rPr lang="en-US" dirty="0" smtClean="0"/>
-              <a:t>8W.</a:t>
+              <a:t> 5W.</a:t>
             </a:r>
             <a:fld id="{5653AFC6-B420-2E4E-AAAC-D734658728B4}" type="slidenum">
               <a:rPr lang="en-US" smtClean="0"/>
@@ -19007,8 +19106,12 @@
           <a:lstStyle/>
           <a:p>
             <a:r>
+              <a:rPr lang="en-US" dirty="0" err="1" smtClean="0"/>
+              <a:t>lec</a:t>
+            </a:r>
+            <a:r>
               <a:rPr lang="en-US" dirty="0" smtClean="0"/>
-              <a:t>8W.</a:t>
+              <a:t> 5W.</a:t>
             </a:r>
             <a:fld id="{5653AFC6-B420-2E4E-AAAC-D734658728B4}" type="slidenum">
               <a:rPr lang="en-US" smtClean="0"/>
@@ -19757,8 +19860,12 @@
           <a:lstStyle/>
           <a:p>
             <a:r>
+              <a:rPr lang="en-US" dirty="0" err="1" smtClean="0"/>
+              <a:t>lec</a:t>
+            </a:r>
+            <a:r>
               <a:rPr lang="en-US" dirty="0" smtClean="0"/>
-              <a:t>8W.</a:t>
+              <a:t> 5W.</a:t>
             </a:r>
             <a:fld id="{5653AFC6-B420-2E4E-AAAC-D734658728B4}" type="slidenum">
               <a:rPr lang="en-US" smtClean="0"/>
@@ -20226,8 +20333,12 @@
           <a:lstStyle/>
           <a:p>
             <a:r>
+              <a:rPr lang="en-US" dirty="0" err="1" smtClean="0"/>
+              <a:t>lec</a:t>
+            </a:r>
+            <a:r>
               <a:rPr lang="en-US" dirty="0" smtClean="0"/>
-              <a:t>8W.</a:t>
+              <a:t> 5W.</a:t>
             </a:r>
             <a:fld id="{5653AFC6-B420-2E4E-AAAC-D734658728B4}" type="slidenum">
               <a:rPr lang="en-US" smtClean="0"/>
@@ -20759,8 +20870,12 @@
           <a:lstStyle/>
           <a:p>
             <a:r>
+              <a:rPr lang="en-US" dirty="0" err="1" smtClean="0"/>
+              <a:t>lec</a:t>
+            </a:r>
+            <a:r>
               <a:rPr lang="en-US" dirty="0" smtClean="0"/>
-              <a:t>8W.</a:t>
+              <a:t> 5W.</a:t>
             </a:r>
             <a:fld id="{5653AFC6-B420-2E4E-AAAC-D734658728B4}" type="slidenum">
               <a:rPr lang="en-US" smtClean="0"/>
@@ -21857,8 +21972,12 @@
           <a:lstStyle/>
           <a:p>
             <a:r>
+              <a:rPr lang="en-US" dirty="0" err="1" smtClean="0"/>
+              <a:t>lec</a:t>
+            </a:r>
+            <a:r>
               <a:rPr lang="en-US" dirty="0" smtClean="0"/>
-              <a:t>8W.</a:t>
+              <a:t> 5W.</a:t>
             </a:r>
             <a:fld id="{5653AFC6-B420-2E4E-AAAC-D734658728B4}" type="slidenum">
               <a:rPr lang="en-US" smtClean="0"/>
@@ -22618,8 +22737,12 @@
           <a:lstStyle/>
           <a:p>
             <a:r>
+              <a:rPr lang="en-US" dirty="0" err="1" smtClean="0"/>
+              <a:t>lec</a:t>
+            </a:r>
+            <a:r>
               <a:rPr lang="en-US" dirty="0" smtClean="0"/>
-              <a:t>8W.</a:t>
+              <a:t> 5W.</a:t>
             </a:r>
             <a:fld id="{5653AFC6-B420-2E4E-AAAC-D734658728B4}" type="slidenum">
               <a:rPr lang="en-US" smtClean="0"/>
@@ -23224,8 +23347,12 @@
           <a:lstStyle/>
           <a:p>
             <a:r>
+              <a:rPr lang="en-US" dirty="0" err="1" smtClean="0"/>
+              <a:t>lec</a:t>
+            </a:r>
+            <a:r>
               <a:rPr lang="en-US" dirty="0" smtClean="0"/>
-              <a:t>8W.</a:t>
+              <a:t> 5W.</a:t>
             </a:r>
             <a:fld id="{5653AFC6-B420-2E4E-AAAC-D734658728B4}" type="slidenum">
               <a:rPr lang="en-US" smtClean="0"/>
@@ -23928,8 +24055,12 @@
           <a:lstStyle/>
           <a:p>
             <a:r>
+              <a:rPr lang="en-US" dirty="0" err="1" smtClean="0"/>
+              <a:t>lec</a:t>
+            </a:r>
+            <a:r>
               <a:rPr lang="en-US" dirty="0" smtClean="0"/>
-              <a:t>8W.</a:t>
+              <a:t> 5W.</a:t>
             </a:r>
             <a:fld id="{5653AFC6-B420-2E4E-AAAC-D734658728B4}" type="slidenum">
               <a:rPr lang="en-US" smtClean="0"/>
@@ -24516,8 +24647,12 @@
           <a:lstStyle/>
           <a:p>
             <a:r>
+              <a:rPr lang="en-US" dirty="0" err="1" smtClean="0"/>
+              <a:t>lec</a:t>
+            </a:r>
+            <a:r>
               <a:rPr lang="en-US" dirty="0" smtClean="0"/>
-              <a:t>8W.</a:t>
+              <a:t> 5W.</a:t>
             </a:r>
             <a:fld id="{5653AFC6-B420-2E4E-AAAC-D734658728B4}" type="slidenum">
               <a:rPr lang="en-US" smtClean="0"/>
@@ -24970,8 +25105,12 @@
           <a:lstStyle/>
           <a:p>
             <a:r>
+              <a:rPr lang="en-US" dirty="0" err="1" smtClean="0"/>
+              <a:t>lec</a:t>
+            </a:r>
+            <a:r>
               <a:rPr lang="en-US" dirty="0" smtClean="0"/>
-              <a:t>8W.</a:t>
+              <a:t> 5W.</a:t>
             </a:r>
             <a:fld id="{5653AFC6-B420-2E4E-AAAC-D734658728B4}" type="slidenum">
               <a:rPr lang="en-US" smtClean="0"/>
@@ -25200,8 +25339,12 @@
           <a:lstStyle/>
           <a:p>
             <a:r>
+              <a:rPr lang="en-US" dirty="0" err="1" smtClean="0"/>
+              <a:t>lec</a:t>
+            </a:r>
+            <a:r>
               <a:rPr lang="en-US" dirty="0" smtClean="0"/>
-              <a:t>8W.</a:t>
+              <a:t> 5W.</a:t>
             </a:r>
             <a:fld id="{5653AFC6-B420-2E4E-AAAC-D734658728B4}" type="slidenum">
               <a:rPr lang="en-US" smtClean="0"/>
@@ -25987,8 +26130,12 @@
           <a:lstStyle/>
           <a:p>
             <a:r>
+              <a:rPr lang="en-US" dirty="0" err="1" smtClean="0"/>
+              <a:t>lec</a:t>
+            </a:r>
+            <a:r>
               <a:rPr lang="en-US" dirty="0" smtClean="0"/>
-              <a:t>8W.</a:t>
+              <a:t> 5W.</a:t>
             </a:r>
             <a:fld id="{5653AFC6-B420-2E4E-AAAC-D734658728B4}" type="slidenum">
               <a:rPr lang="en-US" smtClean="0"/>
@@ -27092,8 +27239,12 @@
           <a:lstStyle/>
           <a:p>
             <a:r>
+              <a:rPr lang="en-US" dirty="0" err="1" smtClean="0"/>
+              <a:t>lec</a:t>
+            </a:r>
+            <a:r>
               <a:rPr lang="en-US" dirty="0" smtClean="0"/>
-              <a:t>8W.</a:t>
+              <a:t> 5W.</a:t>
             </a:r>
             <a:fld id="{5653AFC6-B420-2E4E-AAAC-D734658728B4}" type="slidenum">
               <a:rPr lang="en-US" smtClean="0"/>
@@ -28492,8 +28643,12 @@
           <a:lstStyle/>
           <a:p>
             <a:r>
+              <a:rPr lang="en-US" dirty="0" err="1" smtClean="0"/>
+              <a:t>lec</a:t>
+            </a:r>
+            <a:r>
               <a:rPr lang="en-US" dirty="0" smtClean="0"/>
-              <a:t>8W.</a:t>
+              <a:t> 5W.</a:t>
             </a:r>
             <a:fld id="{5653AFC6-B420-2E4E-AAAC-D734658728B4}" type="slidenum">
               <a:rPr lang="en-US" smtClean="0"/>
@@ -29436,8 +29591,12 @@
           <a:lstStyle/>
           <a:p>
             <a:r>
+              <a:rPr lang="en-US" dirty="0" err="1" smtClean="0"/>
+              <a:t>lec</a:t>
+            </a:r>
+            <a:r>
               <a:rPr lang="en-US" dirty="0" smtClean="0"/>
-              <a:t>8W.</a:t>
+              <a:t> 5W.</a:t>
             </a:r>
             <a:fld id="{5653AFC6-B420-2E4E-AAAC-D734658728B4}" type="slidenum">
               <a:rPr lang="en-US" smtClean="0"/>
@@ -30199,8 +30358,12 @@
           <a:lstStyle/>
           <a:p>
             <a:r>
+              <a:rPr lang="en-US" dirty="0" err="1" smtClean="0"/>
+              <a:t>lec</a:t>
+            </a:r>
+            <a:r>
               <a:rPr lang="en-US" dirty="0" smtClean="0"/>
-              <a:t>8W.</a:t>
+              <a:t> 5W.</a:t>
             </a:r>
             <a:fld id="{5653AFC6-B420-2E4E-AAAC-D734658728B4}" type="slidenum">
               <a:rPr lang="en-US" smtClean="0"/>
@@ -31115,8 +31278,12 @@
           <a:lstStyle/>
           <a:p>
             <a:r>
+              <a:rPr lang="en-US" dirty="0" err="1" smtClean="0"/>
+              <a:t>lec</a:t>
+            </a:r>
+            <a:r>
               <a:rPr lang="en-US" dirty="0" smtClean="0"/>
-              <a:t>8W.</a:t>
+              <a:t> 5W.</a:t>
             </a:r>
             <a:fld id="{5653AFC6-B420-2E4E-AAAC-D734658728B4}" type="slidenum">
               <a:rPr lang="en-US" smtClean="0"/>
@@ -31616,8 +31783,12 @@
           <a:lstStyle/>
           <a:p>
             <a:r>
+              <a:rPr lang="en-US" dirty="0" err="1" smtClean="0"/>
+              <a:t>lec</a:t>
+            </a:r>
+            <a:r>
               <a:rPr lang="en-US" dirty="0" smtClean="0"/>
-              <a:t>8W.</a:t>
+              <a:t> 5W.</a:t>
             </a:r>
             <a:fld id="{5653AFC6-B420-2E4E-AAAC-D734658728B4}" type="slidenum">
               <a:rPr lang="en-US" smtClean="0"/>
@@ -32143,8 +32314,12 @@
           <a:lstStyle/>
           <a:p>
             <a:r>
+              <a:rPr lang="en-US" dirty="0" err="1" smtClean="0"/>
+              <a:t>lec</a:t>
+            </a:r>
+            <a:r>
               <a:rPr lang="en-US" dirty="0" smtClean="0"/>
-              <a:t>8W.</a:t>
+              <a:t> 5W.</a:t>
             </a:r>
             <a:fld id="{5653AFC6-B420-2E4E-AAAC-D734658728B4}" type="slidenum">
               <a:rPr lang="en-US" smtClean="0"/>
@@ -32603,8 +32778,12 @@
           <a:lstStyle/>
           <a:p>
             <a:r>
+              <a:rPr lang="en-US" dirty="0" err="1" smtClean="0"/>
+              <a:t>lec</a:t>
+            </a:r>
+            <a:r>
               <a:rPr lang="en-US" dirty="0" smtClean="0"/>
-              <a:t>8W.</a:t>
+              <a:t> 5W.</a:t>
             </a:r>
             <a:fld id="{5653AFC6-B420-2E4E-AAAC-D734658728B4}" type="slidenum">
               <a:rPr lang="en-US" smtClean="0"/>
@@ -32974,8 +33153,12 @@
           <a:lstStyle/>
           <a:p>
             <a:r>
+              <a:rPr lang="en-US" dirty="0" err="1" smtClean="0"/>
+              <a:t>lec</a:t>
+            </a:r>
+            <a:r>
               <a:rPr lang="en-US" dirty="0" smtClean="0"/>
-              <a:t>8W.</a:t>
+              <a:t> 5W.</a:t>
             </a:r>
             <a:fld id="{5653AFC6-B420-2E4E-AAAC-D734658728B4}" type="slidenum">
               <a:rPr lang="en-US" smtClean="0"/>
@@ -33647,8 +33830,12 @@
           <a:lstStyle/>
           <a:p>
             <a:r>
+              <a:rPr lang="en-US" dirty="0" err="1" smtClean="0"/>
+              <a:t>lec</a:t>
+            </a:r>
+            <a:r>
               <a:rPr lang="en-US" dirty="0" smtClean="0"/>
-              <a:t>8W.</a:t>
+              <a:t> 5W.</a:t>
             </a:r>
             <a:fld id="{5653AFC6-B420-2E4E-AAAC-D734658728B4}" type="slidenum">
               <a:rPr lang="en-US" smtClean="0"/>
@@ -34213,8 +34400,12 @@
           <a:lstStyle/>
           <a:p>
             <a:r>
+              <a:rPr lang="en-US" dirty="0" err="1" smtClean="0"/>
+              <a:t>lec</a:t>
+            </a:r>
+            <a:r>
               <a:rPr lang="en-US" dirty="0" smtClean="0"/>
-              <a:t>8W.</a:t>
+              <a:t> 5W.</a:t>
             </a:r>
             <a:fld id="{5653AFC6-B420-2E4E-AAAC-D734658728B4}" type="slidenum">
               <a:rPr lang="en-US" smtClean="0"/>
@@ -34846,8 +35037,12 @@
           <a:lstStyle/>
           <a:p>
             <a:r>
+              <a:rPr lang="en-US" dirty="0" err="1" smtClean="0"/>
+              <a:t>lec</a:t>
+            </a:r>
+            <a:r>
               <a:rPr lang="en-US" dirty="0" smtClean="0"/>
-              <a:t>8W.</a:t>
+              <a:t> 5W.</a:t>
             </a:r>
             <a:fld id="{5653AFC6-B420-2E4E-AAAC-D734658728B4}" type="slidenum">
               <a:rPr lang="en-US" smtClean="0"/>
@@ -35585,8 +35780,12 @@
           <a:lstStyle/>
           <a:p>
             <a:r>
+              <a:rPr lang="en-US" dirty="0" err="1" smtClean="0"/>
+              <a:t>lec</a:t>
+            </a:r>
+            <a:r>
               <a:rPr lang="en-US" dirty="0" smtClean="0"/>
-              <a:t>8W.</a:t>
+              <a:t> 5W.</a:t>
             </a:r>
             <a:fld id="{5653AFC6-B420-2E4E-AAAC-D734658728B4}" type="slidenum">
               <a:rPr lang="en-US" smtClean="0"/>

</xml_diff>